<commit_message>
lots of stuff changed
</commit_message>
<xml_diff>
--- a/AssetStoreImages/ObjectPool.pptx
+++ b/AssetStoreImages/ObjectPool.pptx
@@ -6,6 +6,7 @@
   </p:sldMasterIdLst>
   <p:sldIdLst>
     <p:sldId id="256" r:id="rId2"/>
+    <p:sldId id="257" r:id="rId3"/>
   </p:sldIdLst>
   <p:sldSz cx="12192000" cy="6858000"/>
   <p:notesSz cx="6858000" cy="9144000"/>
@@ -110,6 +111,7 @@
         <p14:section name="Default Section" id="{3D66AB12-460E-4DB3-A4C6-929110339725}">
           <p14:sldIdLst>
             <p14:sldId id="256"/>
+            <p14:sldId id="257"/>
           </p14:sldIdLst>
         </p14:section>
       </p14:sectionLst>
@@ -252,7 +254,7 @@
           <a:p>
             <a:fld id="{DB8F713F-A4D9-4943-8EFF-DFBAE8444DD2}" type="datetimeFigureOut">
               <a:rPr lang="da-DK" smtClean="0"/>
-              <a:t>04-04-2016</a:t>
+              <a:t>05-04-2016</a:t>
             </a:fld>
             <a:endParaRPr lang="da-DK"/>
           </a:p>
@@ -422,7 +424,7 @@
           <a:p>
             <a:fld id="{DB8F713F-A4D9-4943-8EFF-DFBAE8444DD2}" type="datetimeFigureOut">
               <a:rPr lang="da-DK" smtClean="0"/>
-              <a:t>04-04-2016</a:t>
+              <a:t>05-04-2016</a:t>
             </a:fld>
             <a:endParaRPr lang="da-DK"/>
           </a:p>
@@ -602,7 +604,7 @@
           <a:p>
             <a:fld id="{DB8F713F-A4D9-4943-8EFF-DFBAE8444DD2}" type="datetimeFigureOut">
               <a:rPr lang="da-DK" smtClean="0"/>
-              <a:t>04-04-2016</a:t>
+              <a:t>05-04-2016</a:t>
             </a:fld>
             <a:endParaRPr lang="da-DK"/>
           </a:p>
@@ -772,7 +774,7 @@
           <a:p>
             <a:fld id="{DB8F713F-A4D9-4943-8EFF-DFBAE8444DD2}" type="datetimeFigureOut">
               <a:rPr lang="da-DK" smtClean="0"/>
-              <a:t>04-04-2016</a:t>
+              <a:t>05-04-2016</a:t>
             </a:fld>
             <a:endParaRPr lang="da-DK"/>
           </a:p>
@@ -1018,7 +1020,7 @@
           <a:p>
             <a:fld id="{DB8F713F-A4D9-4943-8EFF-DFBAE8444DD2}" type="datetimeFigureOut">
               <a:rPr lang="da-DK" smtClean="0"/>
-              <a:t>04-04-2016</a:t>
+              <a:t>05-04-2016</a:t>
             </a:fld>
             <a:endParaRPr lang="da-DK"/>
           </a:p>
@@ -1250,7 +1252,7 @@
           <a:p>
             <a:fld id="{DB8F713F-A4D9-4943-8EFF-DFBAE8444DD2}" type="datetimeFigureOut">
               <a:rPr lang="da-DK" smtClean="0"/>
-              <a:t>04-04-2016</a:t>
+              <a:t>05-04-2016</a:t>
             </a:fld>
             <a:endParaRPr lang="da-DK"/>
           </a:p>
@@ -1617,7 +1619,7 @@
           <a:p>
             <a:fld id="{DB8F713F-A4D9-4943-8EFF-DFBAE8444DD2}" type="datetimeFigureOut">
               <a:rPr lang="da-DK" smtClean="0"/>
-              <a:t>04-04-2016</a:t>
+              <a:t>05-04-2016</a:t>
             </a:fld>
             <a:endParaRPr lang="da-DK"/>
           </a:p>
@@ -1735,7 +1737,7 @@
           <a:p>
             <a:fld id="{DB8F713F-A4D9-4943-8EFF-DFBAE8444DD2}" type="datetimeFigureOut">
               <a:rPr lang="da-DK" smtClean="0"/>
-              <a:t>04-04-2016</a:t>
+              <a:t>05-04-2016</a:t>
             </a:fld>
             <a:endParaRPr lang="da-DK"/>
           </a:p>
@@ -1830,7 +1832,7 @@
           <a:p>
             <a:fld id="{DB8F713F-A4D9-4943-8EFF-DFBAE8444DD2}" type="datetimeFigureOut">
               <a:rPr lang="da-DK" smtClean="0"/>
-              <a:t>04-04-2016</a:t>
+              <a:t>05-04-2016</a:t>
             </a:fld>
             <a:endParaRPr lang="da-DK"/>
           </a:p>
@@ -2107,7 +2109,7 @@
           <a:p>
             <a:fld id="{DB8F713F-A4D9-4943-8EFF-DFBAE8444DD2}" type="datetimeFigureOut">
               <a:rPr lang="da-DK" smtClean="0"/>
-              <a:t>04-04-2016</a:t>
+              <a:t>05-04-2016</a:t>
             </a:fld>
             <a:endParaRPr lang="da-DK"/>
           </a:p>
@@ -2360,7 +2362,7 @@
           <a:p>
             <a:fld id="{DB8F713F-A4D9-4943-8EFF-DFBAE8444DD2}" type="datetimeFigureOut">
               <a:rPr lang="da-DK" smtClean="0"/>
-              <a:t>04-04-2016</a:t>
+              <a:t>05-04-2016</a:t>
             </a:fld>
             <a:endParaRPr lang="da-DK"/>
           </a:p>
@@ -2573,7 +2575,7 @@
           <a:p>
             <a:fld id="{DB8F713F-A4D9-4943-8EFF-DFBAE8444DD2}" type="datetimeFigureOut">
               <a:rPr lang="da-DK" smtClean="0"/>
-              <a:t>04-04-2016</a:t>
+              <a:t>05-04-2016</a:t>
             </a:fld>
             <a:endParaRPr lang="da-DK"/>
           </a:p>
@@ -3016,6 +3018,9 @@
             <a:lin ang="2700000" scaled="1"/>
             <a:tileRect/>
           </a:gradFill>
+          <a:ln>
+            <a:noFill/>
+          </a:ln>
         </p:spPr>
         <p:style>
           <a:lnRef idx="2">
@@ -3037,40 +3042,10 @@
           <a:bodyPr rtlCol="0" anchor="ctr"/>
           <a:lstStyle/>
           <a:p>
-            <a:pPr algn="ctr"/>
-            <a:r>
-              <a:rPr lang="en-US" sz="3200" b="1" dirty="0" smtClean="0">
-                <a:solidFill>
-                  <a:schemeClr val="bg2">
-                    <a:lumMod val="25000"/>
-                  </a:schemeClr>
-                </a:solidFill>
-                <a:latin typeface="Lato" panose="020F0502020204030203" pitchFamily="34" charset="0"/>
-              </a:rPr>
-              <a:t>Something </a:t>
-            </a:r>
-            <a:r>
-              <a:rPr lang="en-US" sz="3200" b="1" dirty="0" err="1" smtClean="0">
-                <a:solidFill>
-                  <a:schemeClr val="bg2">
-                    <a:lumMod val="25000"/>
-                  </a:schemeClr>
-                </a:solidFill>
-                <a:latin typeface="Lato" panose="020F0502020204030203" pitchFamily="34" charset="0"/>
-              </a:rPr>
-              <a:t>something</a:t>
-            </a:r>
-            <a:endParaRPr lang="da-DK" sz="3200" b="1" dirty="0" smtClean="0">
-              <a:solidFill>
-                <a:schemeClr val="bg2">
-                  <a:lumMod val="25000"/>
-                </a:schemeClr>
-              </a:solidFill>
-              <a:latin typeface="Lato" panose="020F0502020204030203" pitchFamily="34" charset="0"/>
-            </a:endParaRPr>
-          </a:p>
-          <a:p>
-            <a:pPr algn="ctr"/>
+            <a:pPr marL="285750" indent="-285750" algn="ctr">
+              <a:buFont typeface="Arial" panose="020B0604020202020204" pitchFamily="34" charset="0"/>
+              <a:buChar char="•"/>
+            </a:pPr>
             <a:endParaRPr lang="en-US" sz="1600" b="1" dirty="0" smtClean="0">
               <a:solidFill>
                 <a:schemeClr val="bg2">
@@ -3081,18 +3056,24 @@
             </a:endParaRPr>
           </a:p>
           <a:p>
-            <a:pPr algn="ctr"/>
-            <a:r>
-              <a:rPr lang="en-US" sz="1600" b="1" dirty="0" err="1" smtClean="0">
-                <a:solidFill>
-                  <a:schemeClr val="bg2">
-                    <a:lumMod val="25000"/>
-                  </a:schemeClr>
-                </a:solidFill>
-                <a:latin typeface="Lato" panose="020F0502020204030203" pitchFamily="34" charset="0"/>
-              </a:rPr>
-              <a:t>lalalalalalla</a:t>
-            </a:r>
+            <a:pPr marL="285750" indent="-285750" algn="ctr">
+              <a:buFont typeface="Arial" panose="020B0604020202020204" pitchFamily="34" charset="0"/>
+              <a:buChar char="•"/>
+            </a:pPr>
+            <a:endParaRPr lang="en-US" sz="1600" b="1" dirty="0">
+              <a:solidFill>
+                <a:schemeClr val="bg2">
+                  <a:lumMod val="25000"/>
+                </a:schemeClr>
+              </a:solidFill>
+              <a:latin typeface="Lato" panose="020F0502020204030203" pitchFamily="34" charset="0"/>
+            </a:endParaRPr>
+          </a:p>
+          <a:p>
+            <a:pPr marL="285750" indent="-285750" algn="ctr">
+              <a:buFont typeface="Arial" panose="020B0604020202020204" pitchFamily="34" charset="0"/>
+              <a:buChar char="•"/>
+            </a:pPr>
             <a:endParaRPr lang="en-US" sz="1600" b="1" dirty="0" smtClean="0">
               <a:solidFill>
                 <a:schemeClr val="bg2">
@@ -3103,40 +3084,10 @@
             </a:endParaRPr>
           </a:p>
           <a:p>
-            <a:pPr algn="ctr"/>
-            <a:endParaRPr lang="en-US" sz="1600" b="1" dirty="0" smtClean="0">
-              <a:solidFill>
-                <a:schemeClr val="bg2">
-                  <a:lumMod val="25000"/>
-                </a:schemeClr>
-              </a:solidFill>
-              <a:latin typeface="Lato" panose="020F0502020204030203" pitchFamily="34" charset="0"/>
-            </a:endParaRPr>
-          </a:p>
-          <a:p>
-            <a:pPr algn="ctr"/>
-            <a:endParaRPr lang="en-US" sz="1600" b="1" dirty="0">
-              <a:solidFill>
-                <a:schemeClr val="bg2">
-                  <a:lumMod val="25000"/>
-                </a:schemeClr>
-              </a:solidFill>
-              <a:latin typeface="Lato" panose="020F0502020204030203" pitchFamily="34" charset="0"/>
-            </a:endParaRPr>
-          </a:p>
-          <a:p>
-            <a:pPr algn="ctr"/>
-            <a:endParaRPr lang="en-US" sz="1600" b="1" dirty="0" smtClean="0">
-              <a:solidFill>
-                <a:schemeClr val="bg2">
-                  <a:lumMod val="25000"/>
-                </a:schemeClr>
-              </a:solidFill>
-              <a:latin typeface="Lato" panose="020F0502020204030203" pitchFamily="34" charset="0"/>
-            </a:endParaRPr>
-          </a:p>
-          <a:p>
-            <a:pPr algn="ctr"/>
+            <a:pPr marL="285750" indent="-285750" algn="ctr">
+              <a:buFont typeface="Arial" panose="020B0604020202020204" pitchFamily="34" charset="0"/>
+              <a:buChar char="•"/>
+            </a:pPr>
             <a:endParaRPr lang="en-US" sz="1600" b="1" dirty="0">
               <a:solidFill>
                 <a:schemeClr val="bg2">
@@ -3168,6 +3119,9 @@
               <a:lumOff val="25000"/>
             </a:schemeClr>
           </a:solidFill>
+          <a:ln>
+            <a:noFill/>
+          </a:ln>
         </p:spPr>
         <p:style>
           <a:lnRef idx="2">
@@ -3202,8 +3156,8 @@
         </p:nvSpPr>
         <p:spPr>
           <a:xfrm>
-            <a:off x="901522" y="4124459"/>
-            <a:ext cx="4520484" cy="1867437"/>
+            <a:off x="288324" y="254953"/>
+            <a:ext cx="4835611" cy="4615887"/>
           </a:xfrm>
           <a:prstGeom prst="rect">
             <a:avLst/>
@@ -3236,23 +3190,478 @@
           <a:bodyPr rtlCol="0" anchor="ctr"/>
           <a:lstStyle/>
           <a:p>
-            <a:pPr algn="ctr"/>
-            <a:r>
-              <a:rPr lang="en-US" sz="4400" dirty="0" err="1" smtClean="0">
+            <a:pPr marL="1028700" lvl="1" indent="-571500">
+              <a:buFont typeface="Arial" panose="020B0604020202020204" pitchFamily="34" charset="0"/>
+              <a:buChar char="•"/>
+            </a:pPr>
+            <a:r>
+              <a:rPr lang="da-DK" sz="3200" dirty="0" smtClean="0">
                 <a:latin typeface="Lato" panose="020F0502020204030203" pitchFamily="34" charset="0"/>
               </a:rPr>
-              <a:t>lululullu</a:t>
-            </a:r>
-            <a:endParaRPr lang="da-DK" sz="4400" dirty="0">
+              <a:t>Grows as needed</a:t>
+            </a:r>
+          </a:p>
+          <a:p>
+            <a:pPr marL="1028700" lvl="1" indent="-571500">
+              <a:buFont typeface="Arial" panose="020B0604020202020204" pitchFamily="34" charset="0"/>
+              <a:buChar char="•"/>
+            </a:pPr>
+            <a:r>
+              <a:rPr lang="da-DK" sz="3200" dirty="0" smtClean="0">
+                <a:latin typeface="Lato" panose="020F0502020204030203" pitchFamily="34" charset="0"/>
+              </a:rPr>
+              <a:t>Has Unit Tests</a:t>
+            </a:r>
+          </a:p>
+          <a:p>
+            <a:pPr marL="1028700" lvl="1" indent="-571500">
+              <a:buFont typeface="Arial" panose="020B0604020202020204" pitchFamily="34" charset="0"/>
+              <a:buChar char="•"/>
+            </a:pPr>
+            <a:r>
+              <a:rPr lang="da-DK" sz="3200" dirty="0">
+                <a:latin typeface="Lato" panose="020F0502020204030203" pitchFamily="34" charset="0"/>
+              </a:rPr>
+              <a:t>One pool for all </a:t>
+            </a:r>
+            <a:r>
+              <a:rPr lang="da-DK" sz="3200" dirty="0" smtClean="0">
+                <a:latin typeface="Lato" panose="020F0502020204030203" pitchFamily="34" charset="0"/>
+              </a:rPr>
+              <a:t>scenes</a:t>
+            </a:r>
+          </a:p>
+          <a:p>
+            <a:pPr marL="1028700" lvl="1" indent="-571500">
+              <a:buFont typeface="Arial" panose="020B0604020202020204" pitchFamily="34" charset="0"/>
+              <a:buChar char="•"/>
+            </a:pPr>
+            <a:r>
+              <a:rPr lang="da-DK" sz="3200" dirty="0" smtClean="0">
+                <a:latin typeface="Lato" panose="020F0502020204030203" pitchFamily="34" charset="0"/>
+              </a:rPr>
+              <a:t>Tested to be 42% faster</a:t>
+            </a:r>
+            <a:endParaRPr lang="da-DK" sz="3200" dirty="0">
               <a:latin typeface="Lato" panose="020F0502020204030203" pitchFamily="34" charset="0"/>
             </a:endParaRPr>
           </a:p>
-        </p:txBody>
-      </p:sp>
+          <a:p>
+            <a:pPr marL="1028700" lvl="1" indent="-571500">
+              <a:buFont typeface="Arial" panose="020B0604020202020204" pitchFamily="34" charset="0"/>
+              <a:buChar char="•"/>
+            </a:pPr>
+            <a:endParaRPr lang="da-DK" sz="3200" dirty="0" smtClean="0">
+              <a:latin typeface="Lato" panose="020F0502020204030203" pitchFamily="34" charset="0"/>
+            </a:endParaRPr>
+          </a:p>
+        </p:txBody>
+      </p:sp>
+      <p:pic>
+        <p:nvPicPr>
+          <p:cNvPr id="3" name="Picture 2"/>
+          <p:cNvPicPr>
+            <a:picLocks noChangeAspect="1"/>
+          </p:cNvPicPr>
+          <p:nvPr/>
+        </p:nvPicPr>
+        <p:blipFill>
+          <a:blip r:embed="rId2">
+            <a:extLst>
+              <a:ext uri="{28A0092B-C50C-407E-A947-70E740481C1C}">
+                <a14:useLocalDpi xmlns:a14="http://schemas.microsoft.com/office/drawing/2010/main" val="0"/>
+              </a:ext>
+            </a:extLst>
+          </a:blip>
+          <a:stretch>
+            <a:fillRect/>
+          </a:stretch>
+        </p:blipFill>
+        <p:spPr>
+          <a:xfrm>
+            <a:off x="7369178" y="1509065"/>
+            <a:ext cx="3038899" cy="1857634"/>
+          </a:xfrm>
+          <a:prstGeom prst="rect">
+            <a:avLst/>
+          </a:prstGeom>
+          <a:ln>
+            <a:noFill/>
+          </a:ln>
+          <a:effectLst>
+            <a:outerShdw blurRad="292100" dist="139700" dir="2700000" algn="tl" rotWithShape="0">
+              <a:srgbClr val="333333">
+                <a:alpha val="65000"/>
+              </a:srgbClr>
+            </a:outerShdw>
+          </a:effectLst>
+        </p:spPr>
+      </p:pic>
     </p:spTree>
     <p:extLst>
       <p:ext uri="{BB962C8B-B14F-4D97-AF65-F5344CB8AC3E}">
         <p14:creationId xmlns:p14="http://schemas.microsoft.com/office/powerpoint/2010/main" val="2401968680"/>
+      </p:ext>
+    </p:extLst>
+  </p:cSld>
+  <p:clrMapOvr>
+    <a:masterClrMapping/>
+  </p:clrMapOvr>
+  <p:timing>
+    <p:tnLst>
+      <p:par>
+        <p:cTn id="1" dur="indefinite" restart="never" nodeType="tmRoot"/>
+      </p:par>
+    </p:tnLst>
+  </p:timing>
+</p:sld>
+</file>
+
+<file path=ppt/slides/slide2.xml><?xml version="1.0" encoding="utf-8"?>
+<p:sld xmlns:a="http://schemas.openxmlformats.org/drawingml/2006/main" xmlns:r="http://schemas.openxmlformats.org/officeDocument/2006/relationships" xmlns:p="http://schemas.openxmlformats.org/presentationml/2006/main">
+  <p:cSld>
+    <p:spTree>
+      <p:nvGrpSpPr>
+        <p:cNvPr id="1" name=""/>
+        <p:cNvGrpSpPr/>
+        <p:nvPr/>
+      </p:nvGrpSpPr>
+      <p:grpSpPr>
+        <a:xfrm>
+          <a:off x="0" y="0"/>
+          <a:ext cx="0" cy="0"/>
+          <a:chOff x="0" y="0"/>
+          <a:chExt cx="0" cy="0"/>
+        </a:xfrm>
+      </p:grpSpPr>
+      <p:sp>
+        <p:nvSpPr>
+          <p:cNvPr id="4" name="Rectangle 3"/>
+          <p:cNvSpPr/>
+          <p:nvPr/>
+        </p:nvSpPr>
+        <p:spPr>
+          <a:xfrm>
+            <a:off x="0" y="0"/>
+            <a:ext cx="12192000" cy="6858000"/>
+          </a:xfrm>
+          <a:prstGeom prst="rect">
+            <a:avLst/>
+          </a:prstGeom>
+          <a:gradFill flip="none" rotWithShape="1">
+            <a:gsLst>
+              <a:gs pos="0">
+                <a:schemeClr val="accent3">
+                  <a:tint val="66000"/>
+                  <a:satMod val="160000"/>
+                </a:schemeClr>
+              </a:gs>
+              <a:gs pos="50000">
+                <a:schemeClr val="accent3">
+                  <a:tint val="44500"/>
+                  <a:satMod val="160000"/>
+                </a:schemeClr>
+              </a:gs>
+              <a:gs pos="100000">
+                <a:schemeClr val="accent3">
+                  <a:tint val="23500"/>
+                  <a:satMod val="160000"/>
+                </a:schemeClr>
+              </a:gs>
+            </a:gsLst>
+            <a:lin ang="2700000" scaled="1"/>
+            <a:tileRect/>
+          </a:gradFill>
+          <a:ln>
+            <a:noFill/>
+          </a:ln>
+        </p:spPr>
+        <p:style>
+          <a:lnRef idx="2">
+            <a:schemeClr val="accent3">
+              <a:shade val="50000"/>
+            </a:schemeClr>
+          </a:lnRef>
+          <a:fillRef idx="1">
+            <a:schemeClr val="accent3"/>
+          </a:fillRef>
+          <a:effectRef idx="0">
+            <a:schemeClr val="accent3"/>
+          </a:effectRef>
+          <a:fontRef idx="minor">
+            <a:schemeClr val="lt1"/>
+          </a:fontRef>
+        </p:style>
+        <p:txBody>
+          <a:bodyPr rtlCol="0" anchor="ctr"/>
+          <a:lstStyle/>
+          <a:p>
+            <a:pPr marL="285750" indent="-285750" algn="ctr">
+              <a:buFont typeface="Arial" panose="020B0604020202020204" pitchFamily="34" charset="0"/>
+              <a:buChar char="•"/>
+            </a:pPr>
+            <a:endParaRPr lang="en-US" sz="1600" b="1" dirty="0" smtClean="0">
+              <a:solidFill>
+                <a:schemeClr val="bg2">
+                  <a:lumMod val="25000"/>
+                </a:schemeClr>
+              </a:solidFill>
+              <a:latin typeface="Lato" panose="020F0502020204030203" pitchFamily="34" charset="0"/>
+            </a:endParaRPr>
+          </a:p>
+          <a:p>
+            <a:pPr marL="285750" indent="-285750" algn="ctr">
+              <a:buFont typeface="Arial" panose="020B0604020202020204" pitchFamily="34" charset="0"/>
+              <a:buChar char="•"/>
+            </a:pPr>
+            <a:endParaRPr lang="en-US" sz="1600" b="1" dirty="0">
+              <a:solidFill>
+                <a:schemeClr val="bg2">
+                  <a:lumMod val="25000"/>
+                </a:schemeClr>
+              </a:solidFill>
+              <a:latin typeface="Lato" panose="020F0502020204030203" pitchFamily="34" charset="0"/>
+            </a:endParaRPr>
+          </a:p>
+          <a:p>
+            <a:pPr marL="285750" indent="-285750" algn="ctr">
+              <a:buFont typeface="Arial" panose="020B0604020202020204" pitchFamily="34" charset="0"/>
+              <a:buChar char="•"/>
+            </a:pPr>
+            <a:endParaRPr lang="en-US" sz="1600" b="1" dirty="0" smtClean="0">
+              <a:solidFill>
+                <a:schemeClr val="bg2">
+                  <a:lumMod val="25000"/>
+                </a:schemeClr>
+              </a:solidFill>
+              <a:latin typeface="Lato" panose="020F0502020204030203" pitchFamily="34" charset="0"/>
+            </a:endParaRPr>
+          </a:p>
+          <a:p>
+            <a:pPr marL="285750" indent="-285750" algn="ctr">
+              <a:buFont typeface="Arial" panose="020B0604020202020204" pitchFamily="34" charset="0"/>
+              <a:buChar char="•"/>
+            </a:pPr>
+            <a:endParaRPr lang="en-US" sz="1600" b="1" dirty="0">
+              <a:solidFill>
+                <a:schemeClr val="bg2">
+                  <a:lumMod val="25000"/>
+                </a:schemeClr>
+              </a:solidFill>
+              <a:latin typeface="Lato" panose="020F0502020204030203" pitchFamily="34" charset="0"/>
+            </a:endParaRPr>
+          </a:p>
+        </p:txBody>
+      </p:sp>
+      <p:sp>
+        <p:nvSpPr>
+          <p:cNvPr id="5" name="Rectangle 4"/>
+          <p:cNvSpPr/>
+          <p:nvPr/>
+        </p:nvSpPr>
+        <p:spPr>
+          <a:xfrm>
+            <a:off x="0" y="5125792"/>
+            <a:ext cx="12192000" cy="1732209"/>
+          </a:xfrm>
+          <a:prstGeom prst="rect">
+            <a:avLst/>
+          </a:prstGeom>
+          <a:solidFill>
+            <a:schemeClr val="tx1">
+              <a:lumMod val="75000"/>
+              <a:lumOff val="25000"/>
+            </a:schemeClr>
+          </a:solidFill>
+          <a:ln>
+            <a:noFill/>
+          </a:ln>
+        </p:spPr>
+        <p:style>
+          <a:lnRef idx="2">
+            <a:schemeClr val="accent1">
+              <a:shade val="50000"/>
+            </a:schemeClr>
+          </a:lnRef>
+          <a:fillRef idx="1">
+            <a:schemeClr val="accent1"/>
+          </a:fillRef>
+          <a:effectRef idx="0">
+            <a:schemeClr val="accent1"/>
+          </a:effectRef>
+          <a:fontRef idx="minor">
+            <a:schemeClr val="lt1"/>
+          </a:fontRef>
+        </p:style>
+        <p:txBody>
+          <a:bodyPr rtlCol="0" anchor="ctr"/>
+          <a:lstStyle/>
+          <a:p>
+            <a:pPr algn="ctr"/>
+            <a:endParaRPr lang="da-DK" dirty="0"/>
+          </a:p>
+        </p:txBody>
+      </p:sp>
+      <p:sp>
+        <p:nvSpPr>
+          <p:cNvPr id="6" name="Rectangle 5"/>
+          <p:cNvSpPr/>
+          <p:nvPr/>
+        </p:nvSpPr>
+        <p:spPr>
+          <a:xfrm>
+            <a:off x="288324" y="254953"/>
+            <a:ext cx="4835611" cy="4615887"/>
+          </a:xfrm>
+          <a:prstGeom prst="rect">
+            <a:avLst/>
+          </a:prstGeom>
+          <a:effectLst>
+            <a:outerShdw blurRad="50800" dist="38100" dir="2700000" algn="tl" rotWithShape="0">
+              <a:prstClr val="black">
+                <a:alpha val="40000"/>
+              </a:prstClr>
+            </a:outerShdw>
+          </a:effectLst>
+        </p:spPr>
+        <p:style>
+          <a:lnRef idx="2">
+            <a:schemeClr val="accent2">
+              <a:shade val="50000"/>
+            </a:schemeClr>
+          </a:lnRef>
+          <a:fillRef idx="1">
+            <a:schemeClr val="accent2"/>
+          </a:fillRef>
+          <a:effectRef idx="0">
+            <a:schemeClr val="accent2"/>
+          </a:effectRef>
+          <a:fontRef idx="minor">
+            <a:schemeClr val="lt1"/>
+          </a:fontRef>
+        </p:style>
+        <p:txBody>
+          <a:bodyPr rtlCol="0" anchor="ctr"/>
+          <a:lstStyle/>
+          <a:p>
+            <a:pPr marL="1028700" lvl="1" indent="-571500">
+              <a:buFont typeface="Arial" panose="020B0604020202020204" pitchFamily="34" charset="0"/>
+              <a:buChar char="•"/>
+            </a:pPr>
+            <a:r>
+              <a:rPr lang="da-DK" sz="3200" dirty="0" smtClean="0">
+                <a:latin typeface="Lato" panose="020F0502020204030203" pitchFamily="34" charset="0"/>
+              </a:rPr>
+              <a:t>Fully documented</a:t>
+            </a:r>
+          </a:p>
+          <a:p>
+            <a:pPr marL="1028700" lvl="1" indent="-571500">
+              <a:buFont typeface="Arial" panose="020B0604020202020204" pitchFamily="34" charset="0"/>
+              <a:buChar char="•"/>
+            </a:pPr>
+            <a:r>
+              <a:rPr lang="da-DK" sz="3200" dirty="0" smtClean="0">
+                <a:latin typeface="Lato" panose="020F0502020204030203" pitchFamily="34" charset="0"/>
+              </a:rPr>
+              <a:t>Easy to use</a:t>
+            </a:r>
+          </a:p>
+          <a:p>
+            <a:pPr marL="1028700" lvl="1" indent="-571500">
+              <a:buFont typeface="Arial" panose="020B0604020202020204" pitchFamily="34" charset="0"/>
+              <a:buChar char="•"/>
+            </a:pPr>
+            <a:r>
+              <a:rPr lang="da-DK" sz="3200" dirty="0">
+                <a:latin typeface="Lato" panose="020F0502020204030203" pitchFamily="34" charset="0"/>
+              </a:rPr>
+              <a:t>Contain any </a:t>
+            </a:r>
+            <a:r>
+              <a:rPr lang="da-DK" sz="3200" dirty="0" smtClean="0">
+                <a:latin typeface="Lato" panose="020F0502020204030203" pitchFamily="34" charset="0"/>
+              </a:rPr>
+              <a:t>objects</a:t>
+            </a:r>
+            <a:endParaRPr lang="da-DK" sz="3200" dirty="0">
+              <a:latin typeface="Lato" panose="020F0502020204030203" pitchFamily="34" charset="0"/>
+            </a:endParaRPr>
+          </a:p>
+        </p:txBody>
+      </p:sp>
+      <p:pic>
+        <p:nvPicPr>
+          <p:cNvPr id="7" name="Picture 6"/>
+          <p:cNvPicPr>
+            <a:picLocks noChangeAspect="1"/>
+          </p:cNvPicPr>
+          <p:nvPr/>
+        </p:nvPicPr>
+        <p:blipFill>
+          <a:blip r:embed="rId2"/>
+          <a:stretch>
+            <a:fillRect/>
+          </a:stretch>
+        </p:blipFill>
+        <p:spPr>
+          <a:xfrm>
+            <a:off x="5840627" y="1764544"/>
+            <a:ext cx="4591050" cy="3705225"/>
+          </a:xfrm>
+          <a:prstGeom prst="rect">
+            <a:avLst/>
+          </a:prstGeom>
+          <a:ln>
+            <a:noFill/>
+          </a:ln>
+          <a:effectLst>
+            <a:outerShdw blurRad="292100" dist="139700" dir="2700000" algn="tl" rotWithShape="0">
+              <a:srgbClr val="333333">
+                <a:alpha val="65000"/>
+              </a:srgbClr>
+            </a:outerShdw>
+          </a:effectLst>
+        </p:spPr>
+      </p:pic>
+      <p:pic>
+        <p:nvPicPr>
+          <p:cNvPr id="11" name="Picture 10"/>
+          <p:cNvPicPr>
+            <a:picLocks noChangeAspect="1"/>
+          </p:cNvPicPr>
+          <p:nvPr/>
+        </p:nvPicPr>
+        <p:blipFill>
+          <a:blip r:embed="rId3"/>
+          <a:stretch>
+            <a:fillRect/>
+          </a:stretch>
+        </p:blipFill>
+        <p:spPr>
+          <a:xfrm>
+            <a:off x="7636475" y="330821"/>
+            <a:ext cx="4196914" cy="3393586"/>
+          </a:xfrm>
+          <a:prstGeom prst="rect">
+            <a:avLst/>
+          </a:prstGeom>
+          <a:ln>
+            <a:noFill/>
+          </a:ln>
+          <a:effectLst>
+            <a:outerShdw blurRad="292100" dist="139700" dir="2700000" algn="tl" rotWithShape="0">
+              <a:srgbClr val="333333">
+                <a:alpha val="65000"/>
+              </a:srgbClr>
+            </a:outerShdw>
+          </a:effectLst>
+        </p:spPr>
+      </p:pic>
+    </p:spTree>
+    <p:extLst>
+      <p:ext uri="{BB962C8B-B14F-4D97-AF65-F5344CB8AC3E}">
+        <p14:creationId xmlns:p14="http://schemas.microsoft.com/office/powerpoint/2010/main" val="3007342500"/>
       </p:ext>
     </p:extLst>
   </p:cSld>

</xml_diff>